<commit_message>
sumary 19.2 sing + long
</commit_message>
<xml_diff>
--- a/Database advance.pptx
+++ b/Database advance.pptx
@@ -12,6 +12,11 @@
     <p:sldId id="260" r:id="rId6"/>
     <p:sldId id="261" r:id="rId7"/>
     <p:sldId id="262" r:id="rId8"/>
+    <p:sldId id="263" r:id="rId9"/>
+    <p:sldId id="264" r:id="rId10"/>
+    <p:sldId id="265" r:id="rId11"/>
+    <p:sldId id="266" r:id="rId12"/>
+    <p:sldId id="267" r:id="rId13"/>
   </p:sldIdLst>
   <p:sldSz cx="12192000" cy="6858000"/>
   <p:notesSz cx="6858000" cy="9144000"/>
@@ -112,7 +117,7 @@
   </p:defaultTextStyle>
   <p:extLst>
     <p:ext uri="{EFAFB233-063F-42B5-8137-9DF3F51BA10A}">
-      <p15:sldGuideLst xmlns:p15="http://schemas.microsoft.com/office/powerpoint/2012/main"/>
+      <p15:sldGuideLst xmlns:p15="http://schemas.microsoft.com/office/powerpoint/2012/main" xmlns=""/>
     </p:ext>
   </p:extLst>
 </p:presentation>
@@ -249,7 +254,7 @@
           <a:p>
             <a:fld id="{DE6CAEEC-C862-4702-A4AB-A4F7E3DBC3CC}" type="datetimeFigureOut">
               <a:rPr lang="en-US" smtClean="0"/>
-              <a:t>16/10/2018</a:t>
+              <a:t>17-Oct-18</a:t>
             </a:fld>
             <a:endParaRPr lang="en-US"/>
           </a:p>
@@ -419,7 +424,7 @@
           <a:p>
             <a:fld id="{DE6CAEEC-C862-4702-A4AB-A4F7E3DBC3CC}" type="datetimeFigureOut">
               <a:rPr lang="en-US" smtClean="0"/>
-              <a:t>16/10/2018</a:t>
+              <a:t>17-Oct-18</a:t>
             </a:fld>
             <a:endParaRPr lang="en-US"/>
           </a:p>
@@ -599,7 +604,7 @@
           <a:p>
             <a:fld id="{DE6CAEEC-C862-4702-A4AB-A4F7E3DBC3CC}" type="datetimeFigureOut">
               <a:rPr lang="en-US" smtClean="0"/>
-              <a:t>16/10/2018</a:t>
+              <a:t>17-Oct-18</a:t>
             </a:fld>
             <a:endParaRPr lang="en-US"/>
           </a:p>
@@ -769,7 +774,7 @@
           <a:p>
             <a:fld id="{DE6CAEEC-C862-4702-A4AB-A4F7E3DBC3CC}" type="datetimeFigureOut">
               <a:rPr lang="en-US" smtClean="0"/>
-              <a:t>16/10/2018</a:t>
+              <a:t>17-Oct-18</a:t>
             </a:fld>
             <a:endParaRPr lang="en-US"/>
           </a:p>
@@ -1015,7 +1020,7 @@
           <a:p>
             <a:fld id="{DE6CAEEC-C862-4702-A4AB-A4F7E3DBC3CC}" type="datetimeFigureOut">
               <a:rPr lang="en-US" smtClean="0"/>
-              <a:t>16/10/2018</a:t>
+              <a:t>17-Oct-18</a:t>
             </a:fld>
             <a:endParaRPr lang="en-US"/>
           </a:p>
@@ -1247,7 +1252,7 @@
           <a:p>
             <a:fld id="{DE6CAEEC-C862-4702-A4AB-A4F7E3DBC3CC}" type="datetimeFigureOut">
               <a:rPr lang="en-US" smtClean="0"/>
-              <a:t>16/10/2018</a:t>
+              <a:t>17-Oct-18</a:t>
             </a:fld>
             <a:endParaRPr lang="en-US"/>
           </a:p>
@@ -1614,7 +1619,7 @@
           <a:p>
             <a:fld id="{DE6CAEEC-C862-4702-A4AB-A4F7E3DBC3CC}" type="datetimeFigureOut">
               <a:rPr lang="en-US" smtClean="0"/>
-              <a:t>16/10/2018</a:t>
+              <a:t>17-Oct-18</a:t>
             </a:fld>
             <a:endParaRPr lang="en-US"/>
           </a:p>
@@ -1732,7 +1737,7 @@
           <a:p>
             <a:fld id="{DE6CAEEC-C862-4702-A4AB-A4F7E3DBC3CC}" type="datetimeFigureOut">
               <a:rPr lang="en-US" smtClean="0"/>
-              <a:t>16/10/2018</a:t>
+              <a:t>17-Oct-18</a:t>
             </a:fld>
             <a:endParaRPr lang="en-US"/>
           </a:p>
@@ -1827,7 +1832,7 @@
           <a:p>
             <a:fld id="{DE6CAEEC-C862-4702-A4AB-A4F7E3DBC3CC}" type="datetimeFigureOut">
               <a:rPr lang="en-US" smtClean="0"/>
-              <a:t>16/10/2018</a:t>
+              <a:t>17-Oct-18</a:t>
             </a:fld>
             <a:endParaRPr lang="en-US"/>
           </a:p>
@@ -2104,7 +2109,7 @@
           <a:p>
             <a:fld id="{DE6CAEEC-C862-4702-A4AB-A4F7E3DBC3CC}" type="datetimeFigureOut">
               <a:rPr lang="en-US" smtClean="0"/>
-              <a:t>16/10/2018</a:t>
+              <a:t>17-Oct-18</a:t>
             </a:fld>
             <a:endParaRPr lang="en-US"/>
           </a:p>
@@ -2357,7 +2362,7 @@
           <a:p>
             <a:fld id="{DE6CAEEC-C862-4702-A4AB-A4F7E3DBC3CC}" type="datetimeFigureOut">
               <a:rPr lang="en-US" smtClean="0"/>
-              <a:t>16/10/2018</a:t>
+              <a:t>17-Oct-18</a:t>
             </a:fld>
             <a:endParaRPr lang="en-US"/>
           </a:p>
@@ -2570,7 +2575,7 @@
           <a:p>
             <a:fld id="{DE6CAEEC-C862-4702-A4AB-A4F7E3DBC3CC}" type="datetimeFigureOut">
               <a:rPr lang="en-US" smtClean="0"/>
-              <a:t>16/10/2018</a:t>
+              <a:t>17-Oct-18</a:t>
             </a:fld>
             <a:endParaRPr lang="en-US"/>
           </a:p>
@@ -3034,6 +3039,571 @@
 </p:sld>
 </file>
 
+<file path=ppt/slides/slide10.xml><?xml version="1.0" encoding="utf-8"?>
+<p:sld xmlns:a="http://schemas.openxmlformats.org/drawingml/2006/main" xmlns:r="http://schemas.openxmlformats.org/officeDocument/2006/relationships" xmlns:p="http://schemas.openxmlformats.org/presentationml/2006/main">
+  <p:cSld>
+    <p:spTree>
+      <p:nvGrpSpPr>
+        <p:cNvPr id="1" name=""/>
+        <p:cNvGrpSpPr/>
+        <p:nvPr/>
+      </p:nvGrpSpPr>
+      <p:grpSpPr>
+        <a:xfrm>
+          <a:off x="0" y="0"/>
+          <a:ext cx="0" cy="0"/>
+          <a:chOff x="0" y="0"/>
+          <a:chExt cx="0" cy="0"/>
+        </a:xfrm>
+      </p:grpSpPr>
+      <p:sp>
+        <p:nvSpPr>
+          <p:cNvPr id="2" name="Title 1"/>
+          <p:cNvSpPr>
+            <a:spLocks noGrp="1"/>
+          </p:cNvSpPr>
+          <p:nvPr>
+            <p:ph type="title"/>
+          </p:nvPr>
+        </p:nvSpPr>
+        <p:spPr/>
+        <p:txBody>
+          <a:bodyPr/>
+          <a:lstStyle/>
+          <a:p>
+            <a:pPr algn="ctr"/>
+            <a:r>
+              <a:rPr lang="en-US" dirty="0"/>
+              <a:t>Nested </a:t>
+            </a:r>
+            <a:r>
+              <a:rPr lang="en-US" dirty="0" err="1"/>
+              <a:t>Subquery</a:t>
+            </a:r>
+            <a:r>
+              <a:rPr lang="en-US" dirty="0"/>
+              <a:t> </a:t>
+            </a:r>
+            <a:r>
+              <a:rPr lang="en-US" dirty="0" smtClean="0"/>
+              <a:t>Optimization</a:t>
+            </a:r>
+            <a:endParaRPr lang="en-US" dirty="0"/>
+          </a:p>
+        </p:txBody>
+      </p:sp>
+      <p:sp>
+        <p:nvSpPr>
+          <p:cNvPr id="3" name="Content Placeholder 2"/>
+          <p:cNvSpPr>
+            <a:spLocks noGrp="1"/>
+          </p:cNvSpPr>
+          <p:nvPr>
+            <p:ph idx="1"/>
+          </p:nvPr>
+        </p:nvSpPr>
+        <p:spPr/>
+        <p:txBody>
+          <a:bodyPr>
+            <a:normAutofit lnSpcReduction="10000"/>
+          </a:bodyPr>
+          <a:lstStyle/>
+          <a:p>
+            <a:r>
+              <a:rPr lang="en-US" dirty="0"/>
+              <a:t>Consider the query:</a:t>
+            </a:r>
+            <a:br>
+              <a:rPr lang="en-US" dirty="0"/>
+            </a:br>
+            <a:r>
+              <a:rPr lang="en-US" b="1" dirty="0"/>
+              <a:t>SELECT</a:t>
+            </a:r>
+            <a:r>
+              <a:rPr lang="en-US" dirty="0"/>
+              <a:t> </a:t>
+            </a:r>
+            <a:r>
+              <a:rPr lang="en-US" dirty="0" err="1"/>
+              <a:t>Fname</a:t>
+            </a:r>
+            <a:r>
+              <a:rPr lang="en-US" dirty="0"/>
+              <a:t>, </a:t>
+            </a:r>
+            <a:r>
+              <a:rPr lang="en-US" dirty="0" err="1"/>
+              <a:t>Lname</a:t>
+            </a:r>
+            <a:r>
+              <a:rPr lang="en-US" dirty="0"/>
+              <a:t>, Salary</a:t>
+            </a:r>
+            <a:br>
+              <a:rPr lang="en-US" dirty="0"/>
+            </a:br>
+            <a:r>
+              <a:rPr lang="en-US" b="1" dirty="0"/>
+              <a:t>FROM</a:t>
+            </a:r>
+            <a:r>
+              <a:rPr lang="en-US" dirty="0"/>
+              <a:t> EMPLOYEE E</a:t>
+            </a:r>
+            <a:br>
+              <a:rPr lang="en-US" dirty="0"/>
+            </a:br>
+            <a:r>
+              <a:rPr lang="en-US" b="1" dirty="0"/>
+              <a:t>WHERE</a:t>
+            </a:r>
+            <a:r>
+              <a:rPr lang="en-US" dirty="0"/>
+              <a:t> EXISTS ( </a:t>
+            </a:r>
+            <a:r>
+              <a:rPr lang="en-US" b="1" dirty="0"/>
+              <a:t>SELECT</a:t>
+            </a:r>
+            <a:r>
+              <a:rPr lang="en-US" dirty="0"/>
+              <a:t> *</a:t>
+            </a:r>
+            <a:br>
+              <a:rPr lang="en-US" dirty="0"/>
+            </a:br>
+            <a:r>
+              <a:rPr lang="en-US" dirty="0" smtClean="0"/>
+              <a:t>			DEPARTMENT </a:t>
+            </a:r>
+            <a:r>
+              <a:rPr lang="en-US" dirty="0"/>
+              <a:t>D</a:t>
+            </a:r>
+            <a:br>
+              <a:rPr lang="en-US" dirty="0"/>
+            </a:br>
+            <a:r>
+              <a:rPr lang="en-US" dirty="0" smtClean="0"/>
+              <a:t>			</a:t>
+            </a:r>
+            <a:r>
+              <a:rPr lang="en-US" b="1" dirty="0" smtClean="0"/>
+              <a:t>WHERE</a:t>
+            </a:r>
+            <a:r>
+              <a:rPr lang="en-US" dirty="0" smtClean="0"/>
+              <a:t> </a:t>
+            </a:r>
+            <a:r>
+              <a:rPr lang="en-US" dirty="0" err="1" smtClean="0"/>
+              <a:t>D.Dnumber</a:t>
+            </a:r>
+            <a:r>
+              <a:rPr lang="en-US" dirty="0" smtClean="0"/>
+              <a:t> </a:t>
+            </a:r>
+            <a:r>
+              <a:rPr lang="en-US" dirty="0"/>
+              <a:t>= </a:t>
+            </a:r>
+            <a:r>
+              <a:rPr lang="en-US" dirty="0" err="1"/>
+              <a:t>E.Dno</a:t>
+            </a:r>
+            <a:r>
+              <a:rPr lang="en-US" dirty="0"/>
+              <a:t> AND </a:t>
+            </a:r>
+            <a:r>
+              <a:rPr lang="en-US" dirty="0" err="1"/>
+              <a:t>D.Zipcode</a:t>
+            </a:r>
+            <a:r>
+              <a:rPr lang="en-US" dirty="0"/>
+              <a:t>=30332</a:t>
+            </a:r>
+            <a:r>
+              <a:rPr lang="en-US" dirty="0" smtClean="0"/>
+              <a:t>);</a:t>
+            </a:r>
+          </a:p>
+          <a:p>
+            <a:r>
+              <a:rPr lang="en-US" dirty="0"/>
+              <a:t>SELECT </a:t>
+            </a:r>
+            <a:r>
+              <a:rPr lang="en-US" dirty="0" err="1"/>
+              <a:t>Fname</a:t>
+            </a:r>
+            <a:r>
+              <a:rPr lang="en-US" dirty="0"/>
+              <a:t>, </a:t>
+            </a:r>
+            <a:r>
+              <a:rPr lang="en-US" dirty="0" err="1"/>
+              <a:t>Lname</a:t>
+            </a:r>
+            <a:r>
+              <a:rPr lang="en-US" dirty="0"/>
+              <a:t>, Salary</a:t>
+            </a:r>
+            <a:br>
+              <a:rPr lang="en-US" dirty="0"/>
+            </a:br>
+            <a:r>
+              <a:rPr lang="en-US" dirty="0"/>
+              <a:t>FROM EMPLOYEE E, DEPARTMENT D</a:t>
+            </a:r>
+            <a:br>
+              <a:rPr lang="en-US" dirty="0"/>
+            </a:br>
+            <a:r>
+              <a:rPr lang="en-US" dirty="0"/>
+              <a:t>WHERE </a:t>
+            </a:r>
+            <a:r>
+              <a:rPr lang="en-US" dirty="0" err="1"/>
+              <a:t>WHERE</a:t>
+            </a:r>
+            <a:r>
+              <a:rPr lang="en-US" dirty="0"/>
+              <a:t> </a:t>
+            </a:r>
+            <a:r>
+              <a:rPr lang="en-US" dirty="0" err="1"/>
+              <a:t>D.Dnumber</a:t>
+            </a:r>
+            <a:r>
+              <a:rPr lang="en-US" dirty="0"/>
+              <a:t> = </a:t>
+            </a:r>
+            <a:r>
+              <a:rPr lang="en-US" dirty="0" err="1"/>
+              <a:t>E.Dno</a:t>
+            </a:r>
+            <a:r>
+              <a:rPr lang="en-US" dirty="0"/>
+              <a:t> AND </a:t>
+            </a:r>
+            <a:r>
+              <a:rPr lang="en-US" dirty="0" err="1"/>
+              <a:t>D.Zipcode</a:t>
+            </a:r>
+            <a:r>
+              <a:rPr lang="en-US" dirty="0"/>
+              <a:t>=30332</a:t>
+            </a:r>
+            <a:br>
+              <a:rPr lang="en-US" dirty="0"/>
+            </a:br>
+            <a:r>
+              <a:rPr lang="en-US" dirty="0"/>
+              <a:t/>
+            </a:r>
+            <a:br>
+              <a:rPr lang="en-US" dirty="0"/>
+            </a:br>
+            <a:r>
+              <a:rPr lang="en-US" dirty="0"/>
+              <a:t/>
+            </a:r>
+            <a:br>
+              <a:rPr lang="en-US" dirty="0"/>
+            </a:br>
+            <a:endParaRPr lang="en-US" dirty="0"/>
+          </a:p>
+        </p:txBody>
+      </p:sp>
+    </p:spTree>
+    <p:extLst>
+      <p:ext uri="{BB962C8B-B14F-4D97-AF65-F5344CB8AC3E}">
+        <p14:creationId xmlns:p14="http://schemas.microsoft.com/office/powerpoint/2010/main" val="2818338747"/>
+      </p:ext>
+    </p:extLst>
+  </p:cSld>
+  <p:clrMapOvr>
+    <a:masterClrMapping/>
+  </p:clrMapOvr>
+</p:sld>
+</file>
+
+<file path=ppt/slides/slide11.xml><?xml version="1.0" encoding="utf-8"?>
+<p:sld xmlns:a="http://schemas.openxmlformats.org/drawingml/2006/main" xmlns:r="http://schemas.openxmlformats.org/officeDocument/2006/relationships" xmlns:p="http://schemas.openxmlformats.org/presentationml/2006/main">
+  <p:cSld>
+    <p:spTree>
+      <p:nvGrpSpPr>
+        <p:cNvPr id="1" name=""/>
+        <p:cNvGrpSpPr/>
+        <p:nvPr/>
+      </p:nvGrpSpPr>
+      <p:grpSpPr>
+        <a:xfrm>
+          <a:off x="0" y="0"/>
+          <a:ext cx="0" cy="0"/>
+          <a:chOff x="0" y="0"/>
+          <a:chExt cx="0" cy="0"/>
+        </a:xfrm>
+      </p:grpSpPr>
+      <p:sp>
+        <p:nvSpPr>
+          <p:cNvPr id="2" name="Title 1"/>
+          <p:cNvSpPr>
+            <a:spLocks noGrp="1"/>
+          </p:cNvSpPr>
+          <p:nvPr>
+            <p:ph type="title"/>
+          </p:nvPr>
+        </p:nvSpPr>
+        <p:spPr/>
+        <p:txBody>
+          <a:bodyPr>
+            <a:normAutofit/>
+          </a:bodyPr>
+          <a:lstStyle/>
+          <a:p>
+            <a:r>
+              <a:rPr lang="en-US" dirty="0"/>
+              <a:t>19.2.3 </a:t>
+            </a:r>
+            <a:r>
+              <a:rPr lang="en-US" dirty="0" err="1"/>
+              <a:t>Subquery</a:t>
+            </a:r>
+            <a:r>
+              <a:rPr lang="en-US" dirty="0"/>
+              <a:t> (View) Merging </a:t>
+            </a:r>
+            <a:r>
+              <a:rPr lang="en-US" dirty="0" smtClean="0"/>
+              <a:t>Transformation</a:t>
+            </a:r>
+            <a:endParaRPr lang="en-US" dirty="0"/>
+          </a:p>
+        </p:txBody>
+      </p:sp>
+      <p:sp>
+        <p:nvSpPr>
+          <p:cNvPr id="3" name="Content Placeholder 2"/>
+          <p:cNvSpPr>
+            <a:spLocks noGrp="1"/>
+          </p:cNvSpPr>
+          <p:nvPr>
+            <p:ph idx="1"/>
+          </p:nvPr>
+        </p:nvSpPr>
+        <p:spPr/>
+        <p:txBody>
+          <a:bodyPr/>
+          <a:lstStyle/>
+          <a:p>
+            <a:r>
+              <a:rPr lang="en-US" dirty="0"/>
+              <a:t>Consider the following three relations:</a:t>
+            </a:r>
+            <a:br>
+              <a:rPr lang="en-US" dirty="0"/>
+            </a:br>
+            <a:r>
+              <a:rPr lang="en-US" dirty="0"/>
+              <a:t>EMP (</a:t>
+            </a:r>
+            <a:r>
+              <a:rPr lang="en-US" dirty="0" err="1"/>
+              <a:t>Ssn</a:t>
+            </a:r>
+            <a:r>
+              <a:rPr lang="en-US" dirty="0"/>
+              <a:t>, </a:t>
+            </a:r>
+            <a:r>
+              <a:rPr lang="en-US" dirty="0" err="1"/>
+              <a:t>Fn</a:t>
+            </a:r>
+            <a:r>
+              <a:rPr lang="en-US" dirty="0"/>
+              <a:t>, Ln, </a:t>
+            </a:r>
+            <a:r>
+              <a:rPr lang="en-US" dirty="0" err="1"/>
+              <a:t>Dno</a:t>
+            </a:r>
+            <a:r>
+              <a:rPr lang="en-US" dirty="0"/>
+              <a:t>)</a:t>
+            </a:r>
+            <a:br>
+              <a:rPr lang="en-US" dirty="0"/>
+            </a:br>
+            <a:r>
+              <a:rPr lang="en-US" dirty="0"/>
+              <a:t>DEPT (</a:t>
+            </a:r>
+            <a:r>
+              <a:rPr lang="en-US" dirty="0" err="1"/>
+              <a:t>Dno</a:t>
+            </a:r>
+            <a:r>
+              <a:rPr lang="en-US" dirty="0"/>
+              <a:t>, </a:t>
+            </a:r>
+            <a:r>
+              <a:rPr lang="en-US" dirty="0" err="1"/>
+              <a:t>Dname</a:t>
+            </a:r>
+            <a:r>
+              <a:rPr lang="en-US" dirty="0"/>
+              <a:t>, </a:t>
+            </a:r>
+            <a:r>
+              <a:rPr lang="en-US" dirty="0" err="1"/>
+              <a:t>Dmgrname</a:t>
+            </a:r>
+            <a:r>
+              <a:rPr lang="en-US" dirty="0"/>
+              <a:t>, </a:t>
+            </a:r>
+            <a:r>
+              <a:rPr lang="en-US" dirty="0" err="1"/>
+              <a:t>Bldg_id</a:t>
+            </a:r>
+            <a:r>
+              <a:rPr lang="en-US" dirty="0"/>
+              <a:t>)</a:t>
+            </a:r>
+            <a:br>
+              <a:rPr lang="en-US" dirty="0"/>
+            </a:br>
+            <a:r>
+              <a:rPr lang="en-US" dirty="0"/>
+              <a:t>BLDG (</a:t>
+            </a:r>
+            <a:r>
+              <a:rPr lang="en-US" dirty="0" err="1"/>
+              <a:t>Bldg_id</a:t>
+            </a:r>
+            <a:r>
+              <a:rPr lang="en-US" dirty="0"/>
+              <a:t>, </a:t>
+            </a:r>
+            <a:r>
+              <a:rPr lang="en-US" dirty="0" err="1"/>
+              <a:t>No_storeys</a:t>
+            </a:r>
+            <a:r>
+              <a:rPr lang="en-US" dirty="0"/>
+              <a:t>, </a:t>
+            </a:r>
+            <a:r>
+              <a:rPr lang="en-US" dirty="0" err="1"/>
+              <a:t>Addr</a:t>
+            </a:r>
+            <a:r>
+              <a:rPr lang="en-US" dirty="0"/>
+              <a:t>, Phone)</a:t>
+            </a:r>
+            <a:br>
+              <a:rPr lang="en-US" dirty="0"/>
+            </a:br>
+            <a:endParaRPr lang="en-US" dirty="0"/>
+          </a:p>
+        </p:txBody>
+      </p:sp>
+    </p:spTree>
+    <p:extLst>
+      <p:ext uri="{BB962C8B-B14F-4D97-AF65-F5344CB8AC3E}">
+        <p14:creationId xmlns:p14="http://schemas.microsoft.com/office/powerpoint/2010/main" val="1658335584"/>
+      </p:ext>
+    </p:extLst>
+  </p:cSld>
+  <p:clrMapOvr>
+    <a:masterClrMapping/>
+  </p:clrMapOvr>
+</p:sld>
+</file>
+
+<file path=ppt/slides/slide12.xml><?xml version="1.0" encoding="utf-8"?>
+<p:sld xmlns:a="http://schemas.openxmlformats.org/drawingml/2006/main" xmlns:r="http://schemas.openxmlformats.org/officeDocument/2006/relationships" xmlns:p="http://schemas.openxmlformats.org/presentationml/2006/main">
+  <p:cSld>
+    <p:spTree>
+      <p:nvGrpSpPr>
+        <p:cNvPr id="1" name=""/>
+        <p:cNvGrpSpPr/>
+        <p:nvPr/>
+      </p:nvGrpSpPr>
+      <p:grpSpPr>
+        <a:xfrm>
+          <a:off x="0" y="0"/>
+          <a:ext cx="0" cy="0"/>
+          <a:chOff x="0" y="0"/>
+          <a:chExt cx="0" cy="0"/>
+        </a:xfrm>
+      </p:grpSpPr>
+      <p:sp>
+        <p:nvSpPr>
+          <p:cNvPr id="2" name="Title 1"/>
+          <p:cNvSpPr>
+            <a:spLocks noGrp="1"/>
+          </p:cNvSpPr>
+          <p:nvPr>
+            <p:ph type="title"/>
+          </p:nvPr>
+        </p:nvSpPr>
+        <p:spPr/>
+        <p:txBody>
+          <a:bodyPr/>
+          <a:lstStyle/>
+          <a:p>
+            <a:r>
+              <a:rPr lang="en-US" dirty="0"/>
+              <a:t>19.2.4 </a:t>
+            </a:r>
+            <a:r>
+              <a:rPr lang="en-US"/>
+              <a:t>Materialized </a:t>
+            </a:r>
+            <a:r>
+              <a:rPr lang="en-US" smtClean="0"/>
+              <a:t>Views</a:t>
+            </a:r>
+            <a:endParaRPr lang="en-US" dirty="0"/>
+          </a:p>
+        </p:txBody>
+      </p:sp>
+      <p:sp>
+        <p:nvSpPr>
+          <p:cNvPr id="3" name="Content Placeholder 2"/>
+          <p:cNvSpPr>
+            <a:spLocks noGrp="1"/>
+          </p:cNvSpPr>
+          <p:nvPr>
+            <p:ph idx="1"/>
+          </p:nvPr>
+        </p:nvSpPr>
+        <p:spPr/>
+        <p:txBody>
+          <a:bodyPr/>
+          <a:lstStyle/>
+          <a:p>
+            <a:endParaRPr lang="en-US" dirty="0"/>
+          </a:p>
+        </p:txBody>
+      </p:sp>
+    </p:spTree>
+    <p:extLst>
+      <p:ext uri="{BB962C8B-B14F-4D97-AF65-F5344CB8AC3E}">
+        <p14:creationId xmlns:p14="http://schemas.microsoft.com/office/powerpoint/2010/main" val="1575464910"/>
+      </p:ext>
+    </p:extLst>
+  </p:cSld>
+  <p:clrMapOvr>
+    <a:masterClrMapping/>
+  </p:clrMapOvr>
+</p:sld>
+</file>
+
 <file path=ppt/slides/slide2.xml><?xml version="1.0" encoding="utf-8"?>
 <p:sld xmlns:a="http://schemas.openxmlformats.org/drawingml/2006/main" xmlns:r="http://schemas.openxmlformats.org/officeDocument/2006/relationships" xmlns:p="http://schemas.openxmlformats.org/presentationml/2006/main">
   <p:cSld>
@@ -3497,7 +4067,7 @@
           </a:p>
           <a:p>
             <a:r>
-              <a:rPr lang="en-US" dirty="0" smtClean="0"/>
+              <a:rPr lang="en-US" b="1" dirty="0" smtClean="0"/>
               <a:t>SELECT </a:t>
             </a:r>
             <a:r>
@@ -3520,8 +4090,12 @@
               <a:rPr lang="en-US" dirty="0" smtClean="0"/>
             </a:br>
             <a:r>
-              <a:rPr lang="en-US" dirty="0" smtClean="0"/>
-              <a:t>FROM (EMPLOYEE JOIN DEPARTMENT ON </a:t>
+              <a:rPr lang="en-US" b="1" dirty="0" smtClean="0"/>
+              <a:t>FROM</a:t>
+            </a:r>
+            <a:r>
+              <a:rPr lang="en-US" dirty="0" smtClean="0"/>
+              <a:t> (EMPLOYEE JOIN DEPARTMENT ON </a:t>
             </a:r>
             <a:r>
               <a:rPr lang="en-US" dirty="0" err="1" smtClean="0"/>
@@ -3547,8 +4121,12 @@
               <a:rPr lang="en-US" dirty="0"/>
             </a:br>
             <a:r>
-              <a:rPr lang="en-US" dirty="0" smtClean="0"/>
-              <a:t>WHERE </a:t>
+              <a:rPr lang="en-US" b="1" dirty="0" smtClean="0"/>
+              <a:t>WHERE</a:t>
+            </a:r>
+            <a:r>
+              <a:rPr lang="en-US" dirty="0" smtClean="0"/>
+              <a:t> </a:t>
             </a:r>
             <a:r>
               <a:rPr lang="en-US" dirty="0" err="1" smtClean="0"/>
@@ -3586,28 +4164,32 @@
             </a:r>
             <a:r>
               <a:rPr lang="en-US" dirty="0"/>
-              <a:t>=‘Research’(DEPARTMENT) </a:t>
-            </a:r>
-            <a:r>
-              <a:rPr lang="en-US" dirty="0" err="1"/>
+              <a:t>=‘Research’(</a:t>
+            </a:r>
+            <a:r>
+              <a:rPr lang="en-US" dirty="0" smtClean="0"/>
+              <a:t>DEPARTMENT) </a:t>
+            </a:r>
+            <a:r>
+              <a:rPr lang="en-US" dirty="0" err="1" smtClean="0"/>
               <a:t>Dnumber</a:t>
             </a:r>
             <a:r>
-              <a:rPr lang="en-US" dirty="0"/>
+              <a:rPr lang="en-US" dirty="0" smtClean="0"/>
               <a:t>=</a:t>
             </a:r>
             <a:r>
-              <a:rPr lang="en-US" dirty="0" err="1"/>
+              <a:rPr lang="en-US" dirty="0" err="1" smtClean="0"/>
               <a:t>Dno</a:t>
             </a:r>
             <a:r>
-              <a:rPr lang="en-US" dirty="0"/>
-              <a:t> EMPLOYEE)</a:t>
-            </a:r>
-            <a:r>
-              <a:rPr lang="en-US" dirty="0"/>
+              <a:rPr lang="en-US" dirty="0" smtClean="0"/>
               <a:t> </a:t>
             </a:r>
+            <a:r>
+              <a:rPr lang="en-US" dirty="0"/>
+              <a:t>EMPLOYEE) </a:t>
+            </a:r>
             <a:endParaRPr lang="en-US" dirty="0" smtClean="0"/>
           </a:p>
           <a:p>
@@ -3615,21 +4197,17 @@
           </a:p>
           <a:p>
             <a:r>
-              <a:rPr lang="en-US" b="1"/>
+              <a:rPr lang="en-US" b="1" dirty="0"/>
               <a:t>pipelined evaluation</a:t>
             </a:r>
             <a:r>
-              <a:rPr lang="en-US"/>
+              <a:rPr lang="en-US" dirty="0"/>
               <a:t> </a:t>
             </a:r>
-            <a:r>
-              <a:rPr lang="en-US"/>
-              <a:t/>
-            </a:r>
             <a:br>
-              <a:rPr lang="en-US"/>
+              <a:rPr lang="en-US" dirty="0"/>
             </a:br>
-            <a:endParaRPr lang="en-US" smtClean="0"/>
+            <a:endParaRPr lang="en-US" dirty="0" smtClean="0"/>
           </a:p>
           <a:p>
             <a:r>
@@ -3688,6 +4266,10 @@
           <a:bodyPr/>
           <a:lstStyle/>
           <a:p>
+            <a:r>
+              <a:rPr lang="en-US" dirty="0"/>
+              <a:t>Alternatives for Query Evaluation</a:t>
+            </a:r>
             <a:endParaRPr lang="en-US" dirty="0"/>
           </a:p>
         </p:txBody>
@@ -3710,18 +4292,369 @@
         </p:blipFill>
         <p:spPr>
           <a:xfrm>
-            <a:off x="2074112" y="1965282"/>
-            <a:ext cx="4352925" cy="2276475"/>
+            <a:off x="1558722" y="1782402"/>
+            <a:ext cx="8715810" cy="4558159"/>
           </a:xfrm>
-          <a:prstGeom prst="rect">
-            <a:avLst/>
+          <a:prstGeom prst="roundRect">
+            <a:avLst>
+              <a:gd name="adj" fmla="val 16667"/>
+            </a:avLst>
           </a:prstGeom>
+          <a:ln>
+            <a:noFill/>
+          </a:ln>
+          <a:effectLst>
+            <a:outerShdw blurRad="152400" dist="12000" dir="900000" sy="98000" kx="110000" ky="200000" algn="tl" rotWithShape="0">
+              <a:srgbClr val="000000">
+                <a:alpha val="30000"/>
+              </a:srgbClr>
+            </a:outerShdw>
+          </a:effectLst>
+          <a:scene3d>
+            <a:camera prst="perspectiveRelaxed">
+              <a:rot lat="19800000" lon="1200000" rev="20820000"/>
+            </a:camera>
+            <a:lightRig rig="threePt" dir="t"/>
+          </a:scene3d>
+          <a:sp3d contourW="6350" prstMaterial="matte">
+            <a:bevelT w="101600" h="101600"/>
+            <a:contourClr>
+              <a:srgbClr val="969696"/>
+            </a:contourClr>
+          </a:sp3d>
         </p:spPr>
       </p:pic>
     </p:spTree>
     <p:extLst>
       <p:ext uri="{BB962C8B-B14F-4D97-AF65-F5344CB8AC3E}">
         <p14:creationId xmlns:p14="http://schemas.microsoft.com/office/powerpoint/2010/main" val="3644794275"/>
+      </p:ext>
+    </p:extLst>
+  </p:cSld>
+  <p:clrMapOvr>
+    <a:masterClrMapping/>
+  </p:clrMapOvr>
+</p:sld>
+</file>
+
+<file path=ppt/slides/slide8.xml><?xml version="1.0" encoding="utf-8"?>
+<p:sld xmlns:a="http://schemas.openxmlformats.org/drawingml/2006/main" xmlns:r="http://schemas.openxmlformats.org/officeDocument/2006/relationships" xmlns:p="http://schemas.openxmlformats.org/presentationml/2006/main">
+  <p:cSld>
+    <p:spTree>
+      <p:nvGrpSpPr>
+        <p:cNvPr id="1" name=""/>
+        <p:cNvGrpSpPr/>
+        <p:nvPr/>
+      </p:nvGrpSpPr>
+      <p:grpSpPr>
+        <a:xfrm>
+          <a:off x="0" y="0"/>
+          <a:ext cx="0" cy="0"/>
+          <a:chOff x="0" y="0"/>
+          <a:chExt cx="0" cy="0"/>
+        </a:xfrm>
+      </p:grpSpPr>
+      <p:sp>
+        <p:nvSpPr>
+          <p:cNvPr id="2" name="Title 1"/>
+          <p:cNvSpPr>
+            <a:spLocks noGrp="1"/>
+          </p:cNvSpPr>
+          <p:nvPr>
+            <p:ph type="title"/>
+          </p:nvPr>
+        </p:nvSpPr>
+        <p:spPr/>
+        <p:txBody>
+          <a:bodyPr/>
+          <a:lstStyle/>
+          <a:p>
+            <a:r>
+              <a:rPr lang="en-US" dirty="0" smtClean="0"/>
+              <a:t>Alternatives for Query Evaluation</a:t>
+            </a:r>
+            <a:endParaRPr lang="en-US" dirty="0"/>
+          </a:p>
+        </p:txBody>
+      </p:sp>
+      <p:sp>
+        <p:nvSpPr>
+          <p:cNvPr id="3" name="Content Placeholder 2"/>
+          <p:cNvSpPr>
+            <a:spLocks noGrp="1"/>
+          </p:cNvSpPr>
+          <p:nvPr>
+            <p:ph idx="1"/>
+          </p:nvPr>
+        </p:nvSpPr>
+        <p:spPr/>
+        <p:txBody>
+          <a:bodyPr>
+            <a:normAutofit/>
+          </a:bodyPr>
+          <a:lstStyle/>
+          <a:p>
+            <a:r>
+              <a:rPr lang="en-US" dirty="0" smtClean="0"/>
+              <a:t>Execution Plan: </a:t>
+            </a:r>
+          </a:p>
+          <a:p>
+            <a:pPr lvl="1"/>
+            <a:r>
+              <a:rPr lang="en-US" dirty="0" smtClean="0"/>
+              <a:t>index search for the SELECT operation on</a:t>
+            </a:r>
+            <a:br>
+              <a:rPr lang="en-US" dirty="0" smtClean="0"/>
+            </a:br>
+            <a:r>
+              <a:rPr lang="en-US" dirty="0" smtClean="0"/>
+              <a:t>DEPARTMENT (assuming one exits)</a:t>
+            </a:r>
+          </a:p>
+          <a:p>
+            <a:pPr lvl="1"/>
+            <a:r>
+              <a:rPr lang="en-US" dirty="0" smtClean="0"/>
+              <a:t> An index-based nested-loop join algorithm </a:t>
+            </a:r>
+            <a:br>
+              <a:rPr lang="en-US" dirty="0" smtClean="0"/>
+            </a:br>
+            <a:r>
+              <a:rPr lang="en-US" dirty="0" smtClean="0"/>
+              <a:t>that loops over the records in the result of the</a:t>
+            </a:r>
+            <a:br>
+              <a:rPr lang="en-US" dirty="0" smtClean="0"/>
+            </a:br>
+            <a:r>
+              <a:rPr lang="en-US" dirty="0" smtClean="0"/>
+              <a:t>SELECT operation on DEPARTMENT</a:t>
+            </a:r>
+            <a:br>
+              <a:rPr lang="en-US" dirty="0" smtClean="0"/>
+            </a:br>
+            <a:r>
+              <a:rPr lang="en-US" dirty="0" smtClean="0"/>
+              <a:t>for the join operation (assuming an index exists on the </a:t>
+            </a:r>
+            <a:r>
+              <a:rPr lang="en-US" dirty="0" err="1" smtClean="0"/>
+              <a:t>Dno</a:t>
+            </a:r>
+            <a:r>
+              <a:rPr lang="en-US" dirty="0" smtClean="0"/>
+              <a:t> attribute of EMPLOYEE.</a:t>
+            </a:r>
+          </a:p>
+          <a:p>
+            <a:pPr lvl="1"/>
+            <a:r>
+              <a:rPr lang="en-US" dirty="0" smtClean="0"/>
+              <a:t>A scan of the JOIN result for input to the PROJECT operator.</a:t>
+            </a:r>
+          </a:p>
+          <a:p>
+            <a:r>
+              <a:rPr lang="en-US" dirty="0" smtClean="0"/>
+              <a:t>The approach taken for executing the query may specify a materialized or a pipelined evaluation.</a:t>
+            </a:r>
+          </a:p>
+        </p:txBody>
+      </p:sp>
+      <p:pic>
+        <p:nvPicPr>
+          <p:cNvPr id="4" name="Content Placeholder 3"/>
+          <p:cNvPicPr>
+            <a:picLocks noChangeAspect="1"/>
+          </p:cNvPicPr>
+          <p:nvPr/>
+        </p:nvPicPr>
+        <p:blipFill>
+          <a:blip r:embed="rId2"/>
+          <a:stretch>
+            <a:fillRect/>
+          </a:stretch>
+        </p:blipFill>
+        <p:spPr>
+          <a:xfrm>
+            <a:off x="7559035" y="1608437"/>
+            <a:ext cx="4352925" cy="2276475"/>
+          </a:xfrm>
+          <a:prstGeom prst="rect">
+            <a:avLst/>
+          </a:prstGeom>
+          <a:solidFill>
+            <a:srgbClr val="FFFFFF">
+              <a:shade val="85000"/>
+            </a:srgbClr>
+          </a:solidFill>
+          <a:ln w="190500" cap="rnd">
+            <a:solidFill>
+              <a:srgbClr val="FFFFFF"/>
+            </a:solidFill>
+          </a:ln>
+          <a:effectLst>
+            <a:outerShdw blurRad="36195" dist="12700" dir="11400000" algn="tl" rotWithShape="0">
+              <a:srgbClr val="000000">
+                <a:alpha val="33000"/>
+              </a:srgbClr>
+            </a:outerShdw>
+          </a:effectLst>
+          <a:scene3d>
+            <a:camera prst="perspectiveContrastingLeftFacing">
+              <a:rot lat="540000" lon="2100000" rev="0"/>
+            </a:camera>
+            <a:lightRig rig="soft" dir="t"/>
+          </a:scene3d>
+          <a:sp3d contourW="12700" prstMaterial="matte">
+            <a:bevelT w="63500" h="50800"/>
+            <a:contourClr>
+              <a:srgbClr val="C0C0C0"/>
+            </a:contourClr>
+          </a:sp3d>
+        </p:spPr>
+      </p:pic>
+    </p:spTree>
+    <p:extLst>
+      <p:ext uri="{BB962C8B-B14F-4D97-AF65-F5344CB8AC3E}">
+        <p14:creationId xmlns:p14="http://schemas.microsoft.com/office/powerpoint/2010/main" val="1843060939"/>
+      </p:ext>
+    </p:extLst>
+  </p:cSld>
+  <p:clrMapOvr>
+    <a:masterClrMapping/>
+  </p:clrMapOvr>
+</p:sld>
+</file>
+
+<file path=ppt/slides/slide9.xml><?xml version="1.0" encoding="utf-8"?>
+<p:sld xmlns:a="http://schemas.openxmlformats.org/drawingml/2006/main" xmlns:r="http://schemas.openxmlformats.org/officeDocument/2006/relationships" xmlns:p="http://schemas.openxmlformats.org/presentationml/2006/main">
+  <p:cSld>
+    <p:spTree>
+      <p:nvGrpSpPr>
+        <p:cNvPr id="1" name=""/>
+        <p:cNvGrpSpPr/>
+        <p:nvPr/>
+      </p:nvGrpSpPr>
+      <p:grpSpPr>
+        <a:xfrm>
+          <a:off x="0" y="0"/>
+          <a:ext cx="0" cy="0"/>
+          <a:chOff x="0" y="0"/>
+          <a:chExt cx="0" cy="0"/>
+        </a:xfrm>
+      </p:grpSpPr>
+      <p:sp>
+        <p:nvSpPr>
+          <p:cNvPr id="2" name="Title 1"/>
+          <p:cNvSpPr>
+            <a:spLocks noGrp="1"/>
+          </p:cNvSpPr>
+          <p:nvPr>
+            <p:ph type="title"/>
+          </p:nvPr>
+        </p:nvSpPr>
+        <p:spPr/>
+        <p:txBody>
+          <a:bodyPr/>
+          <a:lstStyle/>
+          <a:p>
+            <a:pPr algn="ctr"/>
+            <a:r>
+              <a:rPr lang="en-US" dirty="0"/>
+              <a:t>Alternatives for Query Evaluation</a:t>
+            </a:r>
+          </a:p>
+        </p:txBody>
+      </p:sp>
+      <p:sp>
+        <p:nvSpPr>
+          <p:cNvPr id="3" name="Content Placeholder 2"/>
+          <p:cNvSpPr>
+            <a:spLocks noGrp="1"/>
+          </p:cNvSpPr>
+          <p:nvPr>
+            <p:ph idx="1"/>
+          </p:nvPr>
+        </p:nvSpPr>
+        <p:spPr/>
+        <p:txBody>
+          <a:bodyPr/>
+          <a:lstStyle/>
+          <a:p>
+            <a:r>
+              <a:rPr lang="en-US" dirty="0"/>
+              <a:t>With </a:t>
+            </a:r>
+            <a:r>
+              <a:rPr lang="en-US" b="1" dirty="0"/>
+              <a:t>materialized evaluation</a:t>
+            </a:r>
+            <a:r>
+              <a:rPr lang="en-US" dirty="0"/>
+              <a:t>, the result of an operation is stored as a temporary</a:t>
+            </a:r>
+            <a:br>
+              <a:rPr lang="en-US" dirty="0"/>
+            </a:br>
+            <a:r>
+              <a:rPr lang="en-US" dirty="0"/>
+              <a:t>relation (that is, the result is </a:t>
+            </a:r>
+            <a:r>
+              <a:rPr lang="en-US" i="1" dirty="0"/>
+              <a:t>physically materialized</a:t>
+            </a:r>
+            <a:r>
+              <a:rPr lang="en-US" dirty="0"/>
+              <a:t>)</a:t>
+            </a:r>
+            <a:br>
+              <a:rPr lang="en-US" dirty="0"/>
+            </a:br>
+            <a:endParaRPr lang="en-US" dirty="0" smtClean="0"/>
+          </a:p>
+          <a:p>
+            <a:r>
+              <a:rPr lang="en-US" dirty="0"/>
+              <a:t>On the other hand, with </a:t>
+            </a:r>
+            <a:r>
+              <a:rPr lang="en-US" b="1" dirty="0"/>
+              <a:t>pipelined evaluation</a:t>
+            </a:r>
+            <a:r>
+              <a:rPr lang="en-US" dirty="0"/>
+              <a:t>,</a:t>
+            </a:r>
+            <a:br>
+              <a:rPr lang="en-US" dirty="0"/>
+            </a:br>
+            <a:r>
+              <a:rPr lang="en-US" dirty="0"/>
+              <a:t>as the resulting tuples of an operation are produced, they are forwarded directly</a:t>
+            </a:r>
+            <a:br>
+              <a:rPr lang="en-US" dirty="0"/>
+            </a:br>
+            <a:r>
+              <a:rPr lang="en-US" dirty="0"/>
+              <a:t>to the next operation in the query sequence.</a:t>
+            </a:r>
+            <a:br>
+              <a:rPr lang="en-US" dirty="0"/>
+            </a:br>
+            <a:endParaRPr lang="en-US" dirty="0"/>
+          </a:p>
+        </p:txBody>
+      </p:sp>
+    </p:spTree>
+    <p:extLst>
+      <p:ext uri="{BB962C8B-B14F-4D97-AF65-F5344CB8AC3E}">
+        <p14:creationId xmlns:p14="http://schemas.microsoft.com/office/powerpoint/2010/main" val="3190200403"/>
       </p:ext>
     </p:extLst>
   </p:cSld>
@@ -3774,7 +4707,7 @@
     </a:clrScheme>
     <a:fontScheme name="Office">
       <a:majorFont>
-        <a:latin typeface="Calibri Light" panose="020F0302020204030204"/>
+        <a:latin typeface="Calibri Light"/>
         <a:ea typeface=""/>
         <a:cs typeface=""/>
         <a:font script="Jpan" typeface="ＭＳ Ｐゴシック"/>
@@ -3809,7 +4742,7 @@
         <a:font script="Geor" typeface="Sylfaen"/>
       </a:majorFont>
       <a:minorFont>
-        <a:latin typeface="Calibri" panose="020F0502020204030204"/>
+        <a:latin typeface="Calibri"/>
         <a:ea typeface=""/>
         <a:cs typeface=""/>
         <a:font script="Jpan" typeface="ＭＳ Ｐゴシック"/>
@@ -3986,7 +4919,7 @@
   <a:extraClrSchemeLst/>
   <a:extLst>
     <a:ext uri="{05A4C25C-085E-4340-85A3-A5531E510DB2}">
-      <thm15:themeFamily xmlns:thm15="http://schemas.microsoft.com/office/thememl/2012/main" name="Office Theme" id="{62F939B6-93AF-4DB8-9C6B-D6C7DFDC589F}" vid="{4A3C46E8-61CC-4603-A589-7422A47A8E4A}"/>
+      <thm15:themeFamily xmlns:thm15="http://schemas.microsoft.com/office/thememl/2012/main" xmlns="" name="Office Theme" id="{62F939B6-93AF-4DB8-9C6B-D6C7DFDC589F}" vid="{4A3C46E8-61CC-4603-A589-7422A47A8E4A}"/>
     </a:ext>
   </a:extLst>
 </a:theme>

</xml_diff>